<commit_message>
slides6f hide spanning trees
</commit_message>
<xml_diff>
--- a/restricted/slides6f.pptx
+++ b/restricted/slides6f.pptx
@@ -27040,7 +27040,7 @@
 </file>
 
 <file path=ppt/slides/slide35.xml><?xml version="1.0" encoding="utf-8"?>
-<p:sld xmlns:a="http://schemas.openxmlformats.org/drawingml/2006/main" xmlns:r="http://schemas.openxmlformats.org/officeDocument/2006/relationships" xmlns:mc="http://schemas.openxmlformats.org/markup-compatibility/2006" xmlns:mv="urn:schemas-microsoft-com:mac:vml" xmlns:p="http://schemas.openxmlformats.org/presentationml/2006/main" mc:Ignorable="mv" mc:PreserveAttributes="mv:*">
+<p:sld xmlns:a="http://schemas.openxmlformats.org/drawingml/2006/main" xmlns:r="http://schemas.openxmlformats.org/officeDocument/2006/relationships" xmlns:mc="http://schemas.openxmlformats.org/markup-compatibility/2006" xmlns:mv="urn:schemas-microsoft-com:mac:vml" xmlns:p="http://schemas.openxmlformats.org/presentationml/2006/main" mc:Ignorable="mv" mc:PreserveAttributes="mv:*" show="0">
   <p:cSld>
     <p:spTree>
       <p:nvGrpSpPr>
@@ -27197,7 +27197,7 @@
 </file>
 
 <file path=ppt/slides/slide36.xml><?xml version="1.0" encoding="utf-8"?>
-<p:sld xmlns:a="http://schemas.openxmlformats.org/drawingml/2006/main" xmlns:r="http://schemas.openxmlformats.org/officeDocument/2006/relationships" xmlns:mc="http://schemas.openxmlformats.org/markup-compatibility/2006" xmlns:mv="urn:schemas-microsoft-com:mac:vml" xmlns:p="http://schemas.openxmlformats.org/presentationml/2006/main" mc:Ignorable="mv" mc:PreserveAttributes="mv:*">
+<p:sld xmlns:a="http://schemas.openxmlformats.org/drawingml/2006/main" xmlns:r="http://schemas.openxmlformats.org/officeDocument/2006/relationships" xmlns:mc="http://schemas.openxmlformats.org/markup-compatibility/2006" xmlns:mv="urn:schemas-microsoft-com:mac:vml" xmlns:p="http://schemas.openxmlformats.org/presentationml/2006/main" mc:Ignorable="mv" mc:PreserveAttributes="mv:*" show="0">
   <p:cSld>
     <p:spTree>
       <p:nvGrpSpPr>
@@ -28003,7 +28003,7 @@
 </file>
 
 <file path=ppt/slides/slide37.xml><?xml version="1.0" encoding="utf-8"?>
-<p:sld xmlns:a="http://schemas.openxmlformats.org/drawingml/2006/main" xmlns:r="http://schemas.openxmlformats.org/officeDocument/2006/relationships" xmlns:mc="http://schemas.openxmlformats.org/markup-compatibility/2006" xmlns:mv="urn:schemas-microsoft-com:mac:vml" xmlns:p="http://schemas.openxmlformats.org/presentationml/2006/main" mc:Ignorable="mv" mc:PreserveAttributes="mv:*">
+<p:sld xmlns:a="http://schemas.openxmlformats.org/drawingml/2006/main" xmlns:r="http://schemas.openxmlformats.org/officeDocument/2006/relationships" xmlns:mc="http://schemas.openxmlformats.org/markup-compatibility/2006" xmlns:mv="urn:schemas-microsoft-com:mac:vml" xmlns:p="http://schemas.openxmlformats.org/presentationml/2006/main" mc:Ignorable="mv" mc:PreserveAttributes="mv:*" show="0">
   <p:cSld>
     <p:spTree>
       <p:nvGrpSpPr>
@@ -28779,7 +28779,7 @@
 </file>
 
 <file path=ppt/slides/slide38.xml><?xml version="1.0" encoding="utf-8"?>
-<p:sld xmlns:a="http://schemas.openxmlformats.org/drawingml/2006/main" xmlns:r="http://schemas.openxmlformats.org/officeDocument/2006/relationships" xmlns:mc="http://schemas.openxmlformats.org/markup-compatibility/2006" xmlns:mv="urn:schemas-microsoft-com:mac:vml" xmlns:p="http://schemas.openxmlformats.org/presentationml/2006/main" mc:Ignorable="mv" mc:PreserveAttributes="mv:*">
+<p:sld xmlns:a="http://schemas.openxmlformats.org/drawingml/2006/main" xmlns:r="http://schemas.openxmlformats.org/officeDocument/2006/relationships" xmlns:mc="http://schemas.openxmlformats.org/markup-compatibility/2006" xmlns:mv="urn:schemas-microsoft-com:mac:vml" xmlns:p="http://schemas.openxmlformats.org/presentationml/2006/main" mc:Ignorable="mv" mc:PreserveAttributes="mv:*" show="0">
   <p:cSld>
     <p:spTree>
       <p:nvGrpSpPr>
@@ -29573,7 +29573,7 @@
 </file>
 
 <file path=ppt/slides/slide39.xml><?xml version="1.0" encoding="utf-8"?>
-<p:sld xmlns:a="http://schemas.openxmlformats.org/drawingml/2006/main" xmlns:r="http://schemas.openxmlformats.org/officeDocument/2006/relationships" xmlns:mc="http://schemas.openxmlformats.org/markup-compatibility/2006" xmlns:mv="urn:schemas-microsoft-com:mac:vml" xmlns:p="http://schemas.openxmlformats.org/presentationml/2006/main" mc:Ignorable="mv" mc:PreserveAttributes="mv:*">
+<p:sld xmlns:a="http://schemas.openxmlformats.org/drawingml/2006/main" xmlns:r="http://schemas.openxmlformats.org/officeDocument/2006/relationships" xmlns:mc="http://schemas.openxmlformats.org/markup-compatibility/2006" xmlns:mv="urn:schemas-microsoft-com:mac:vml" xmlns:p="http://schemas.openxmlformats.org/presentationml/2006/main" mc:Ignorable="mv" mc:PreserveAttributes="mv:*" show="0">
   <p:cSld>
     <p:spTree>
       <p:nvGrpSpPr>
@@ -30432,8 +30432,8 @@
         </p:nvSpPr>
         <p:spPr>
           <a:xfrm>
-            <a:off x="283290" y="1609488"/>
-            <a:ext cx="8616297" cy="3500954"/>
+            <a:off x="313527" y="1317167"/>
+            <a:ext cx="8616299" cy="4065403"/>
           </a:xfrm>
           <a:noFill/>
           <a:ln/>
@@ -30442,57 +30442,24 @@
           <a:bodyPr/>
           <a:lstStyle/>
           <a:p>
-            <a:pPr>
+            <a:pPr algn="ctr">
               <a:buFontTx/>
               <a:buNone/>
             </a:pPr>
             <a:r>
-              <a:rPr lang="en-US" sz="9600" dirty="0" smtClean="0"/>
-              <a:t>Problems 1</a:t>
-            </a:r>
-            <a:r>
-              <a:rPr lang="en-US" sz="9600" dirty="0" smtClean="0"/>
-              <a:t>—</a:t>
-            </a:r>
-            <a:r>
-              <a:rPr lang="en-US" sz="9600" dirty="0" smtClean="0"/>
-              <a:t>3</a:t>
-            </a:r>
-          </a:p>
-          <a:p>
-            <a:pPr>
+              <a:rPr lang="en-US" sz="11500" dirty="0" smtClean="0"/>
+              <a:t>Problems</a:t>
+            </a:r>
+          </a:p>
+          <a:p>
+            <a:pPr algn="ctr">
               <a:buFontTx/>
               <a:buNone/>
             </a:pPr>
             <a:r>
-              <a:rPr lang="en-US" sz="9600" dirty="0" smtClean="0"/>
-              <a:t> </a:t>
-            </a:r>
-            <a:r>
-              <a:rPr lang="en-US" sz="9600" dirty="0" smtClean="0"/>
-              <a:t>&amp; 4 </a:t>
-            </a:r>
-            <a:r>
-              <a:rPr lang="en-US" sz="6600" dirty="0" smtClean="0"/>
-              <a:t>(if </a:t>
-            </a:r>
-            <a:r>
-              <a:rPr lang="en-US" sz="6600" dirty="0" err="1" smtClean="0"/>
-              <a:t>u</a:t>
-            </a:r>
-            <a:r>
-              <a:rPr lang="en-US" sz="6600" dirty="0" smtClean="0"/>
-              <a:t> </a:t>
-            </a:r>
-            <a:r>
-              <a:rPr lang="en-US" sz="6600" dirty="0" err="1" smtClean="0"/>
-              <a:t>hv</a:t>
-            </a:r>
-            <a:r>
-              <a:rPr lang="en-US" sz="6600" dirty="0" smtClean="0"/>
-              <a:t> time)</a:t>
-            </a:r>
-            <a:endParaRPr lang="en-US" sz="9600" dirty="0"/>
+              <a:rPr lang="en-US" sz="11500" dirty="0" smtClean="0"/>
+              <a:t>1 &amp; 2</a:t>
+            </a:r>
           </a:p>
         </p:txBody>
       </p:sp>
@@ -30507,96 +30474,9 @@
   <p:timing>
     <p:tnLst>
       <p:par>
-        <p:cTn id="1" dur="indefinite" restart="never" nodeType="tmRoot">
-          <p:childTnLst>
-            <p:seq concurrent="1" nextAc="seek">
-              <p:cTn id="2" dur="indefinite" nodeType="mainSeq">
-                <p:childTnLst>
-                  <p:par>
-                    <p:cTn id="3" fill="hold">
-                      <p:stCondLst>
-                        <p:cond delay="indefinite"/>
-                      </p:stCondLst>
-                      <p:childTnLst>
-                        <p:par>
-                          <p:cTn id="4" fill="hold">
-                            <p:stCondLst>
-                              <p:cond delay="0"/>
-                            </p:stCondLst>
-                            <p:childTnLst>
-                              <p:par>
-                                <p:cTn id="5" presetID="9" presetClass="entr" presetSubtype="0" fill="hold" grpId="0" nodeType="clickEffect">
-                                  <p:stCondLst>
-                                    <p:cond delay="0"/>
-                                  </p:stCondLst>
-                                  <p:childTnLst>
-                                    <p:set>
-                                      <p:cBhvr>
-                                        <p:cTn id="6" dur="1" fill="hold">
-                                          <p:stCondLst>
-                                            <p:cond delay="0"/>
-                                          </p:stCondLst>
-                                        </p:cTn>
-                                        <p:tgtEl>
-                                          <p:spTgt spid="572419">
-                                            <p:txEl>
-                                              <p:pRg st="1" end="1"/>
-                                            </p:txEl>
-                                          </p:spTgt>
-                                        </p:tgtEl>
-                                        <p:attrNameLst>
-                                          <p:attrName>style.visibility</p:attrName>
-                                        </p:attrNameLst>
-                                      </p:cBhvr>
-                                      <p:to>
-                                        <p:strVal val="visible"/>
-                                      </p:to>
-                                    </p:set>
-                                    <p:animEffect transition="in" filter="dissolve">
-                                      <p:cBhvr>
-                                        <p:cTn id="7" dur="500"/>
-                                        <p:tgtEl>
-                                          <p:spTgt spid="572419">
-                                            <p:txEl>
-                                              <p:pRg st="1" end="1"/>
-                                            </p:txEl>
-                                          </p:spTgt>
-                                        </p:tgtEl>
-                                      </p:cBhvr>
-                                    </p:animEffect>
-                                  </p:childTnLst>
-                                </p:cTn>
-                              </p:par>
-                            </p:childTnLst>
-                          </p:cTn>
-                        </p:par>
-                      </p:childTnLst>
-                    </p:cTn>
-                  </p:par>
-                </p:childTnLst>
-              </p:cTn>
-              <p:prevCondLst>
-                <p:cond evt="onPrev" delay="0">
-                  <p:tgtEl>
-                    <p:sldTgt/>
-                  </p:tgtEl>
-                </p:cond>
-              </p:prevCondLst>
-              <p:nextCondLst>
-                <p:cond evt="onNext" delay="0">
-                  <p:tgtEl>
-                    <p:sldTgt/>
-                  </p:tgtEl>
-                </p:cond>
-              </p:nextCondLst>
-            </p:seq>
-          </p:childTnLst>
-        </p:cTn>
+        <p:cTn id="1" dur="indefinite" restart="never" nodeType="tmRoot"/>
       </p:par>
     </p:tnLst>
-    <p:bldLst>
-      <p:bldP spid="572419" grpId="0" uiExpand="1" build="p"/>
-    </p:bldLst>
   </p:timing>
 </p:sld>
 </file>

</xml_diff>